<commit_message>
update ppt with demo image
</commit_message>
<xml_diff>
--- a/Honours_Project.pptx
+++ b/Honours_Project.pptx
@@ -308,7 +308,7 @@
       </p15:sldGuideLst>
     </p:ext>
     <p:ext uri="http://customooxmlschemas.google.com/">
-      <go:slidesCustomData xmlns:go="http://customooxmlschemas.google.com/" xmlns:ahyp="http://schemas.microsoft.com/office/drawing/2018/hyperlinkcolor" xmlns:p15="http://schemas.microsoft.com/office/powerpoint/2012/main" xmlns:p14="http://schemas.microsoft.com/office/powerpoint/2010/main" xmlns:com="http://schemas.openxmlformats.org/drawingml/2006/compatibility" xmlns:pvml="urn:schemas-microsoft-com:office:powerpoint" xmlns:v="urn:schemas-microsoft-com:vml" xmlns:o="urn:schemas-microsoft-com:office:office" xmlns:dgm="http://schemas.openxmlformats.org/drawingml/2006/diagram" xmlns:c="http://schemas.openxmlformats.org/drawingml/2006/chart" xmlns:mv="urn:schemas-microsoft-com:mac:vml" xmlns:mc="http://schemas.openxmlformats.org/markup-compatibility/2006" xmlns="" r:id="rId48" roundtripDataSignature="AMtx7mgOTeGwvpyXv+WHXkZujPTG/Ddnmw=="/>
+      <go:slidesCustomData xmlns="" xmlns:mc="http://schemas.openxmlformats.org/markup-compatibility/2006" xmlns:mv="urn:schemas-microsoft-com:mac:vml" xmlns:c="http://schemas.openxmlformats.org/drawingml/2006/chart" xmlns:dgm="http://schemas.openxmlformats.org/drawingml/2006/diagram" xmlns:o="urn:schemas-microsoft-com:office:office" xmlns:v="urn:schemas-microsoft-com:vml" xmlns:pvml="urn:schemas-microsoft-com:office:powerpoint" xmlns:com="http://schemas.openxmlformats.org/drawingml/2006/compatibility" xmlns:p14="http://schemas.microsoft.com/office/powerpoint/2010/main" xmlns:p15="http://schemas.microsoft.com/office/powerpoint/2012/main" xmlns:ahyp="http://schemas.microsoft.com/office/drawing/2018/hyperlinkcolor" xmlns:go="http://customooxmlschemas.google.com/" r:id="rId48" roundtripDataSignature="AMtx7mgOTeGwvpyXv+WHXkZujPTG/Ddnmw=="/>
     </p:ext>
   </p:extLst>
 </p:presentation>
@@ -29835,7 +29835,7 @@
         </p:nvSpPr>
         <p:spPr>
           <a:xfrm>
-            <a:off x="3170673" y="1988840"/>
+            <a:off x="3170673" y="136525"/>
             <a:ext cx="5850653" cy="1325400"/>
           </a:xfrm>
           <a:prstGeom prst="rect">
@@ -29930,6 +29930,36 @@
           </a:p>
         </p:txBody>
       </p:sp>
+      <p:pic>
+        <p:nvPicPr>
+          <p:cNvPr id="3" name="Picture 2">
+            <a:extLst>
+              <a:ext uri="{FF2B5EF4-FFF2-40B4-BE49-F238E27FC236}">
+                <a16:creationId xmlns:a16="http://schemas.microsoft.com/office/drawing/2014/main" id="{35E9ABDB-0EA0-ACAD-5459-E525470D8DAC}"/>
+              </a:ext>
+            </a:extLst>
+          </p:cNvPr>
+          <p:cNvPicPr>
+            <a:picLocks noChangeAspect="1"/>
+          </p:cNvPicPr>
+          <p:nvPr/>
+        </p:nvPicPr>
+        <p:blipFill>
+          <a:blip r:embed="rId3"/>
+          <a:stretch>
+            <a:fillRect/>
+          </a:stretch>
+        </p:blipFill>
+        <p:spPr>
+          <a:xfrm>
+            <a:off x="1991544" y="1140059"/>
+            <a:ext cx="7613356" cy="5717941"/>
+          </a:xfrm>
+          <a:prstGeom prst="rect">
+            <a:avLst/>
+          </a:prstGeom>
+        </p:spPr>
+      </p:pic>
     </p:spTree>
     <p:extLst>
       <p:ext uri="{BB962C8B-B14F-4D97-AF65-F5344CB8AC3E}">

</xml_diff>